<commit_message>
Added the last version of presentation
</commit_message>
<xml_diff>
--- a/Documentation and designs/Documentation/MATF_prezentacija.pptx
+++ b/Documentation and designs/Documentation/MATF_prezentacija.pptx
@@ -7,6 +7,17 @@
   <p:sldIdLst>
     <p:sldId id="256" r:id="rId2"/>
     <p:sldId id="257" r:id="rId3"/>
+    <p:sldId id="258" r:id="rId4"/>
+    <p:sldId id="259" r:id="rId5"/>
+    <p:sldId id="260" r:id="rId6"/>
+    <p:sldId id="261" r:id="rId7"/>
+    <p:sldId id="262" r:id="rId8"/>
+    <p:sldId id="264" r:id="rId9"/>
+    <p:sldId id="263" r:id="rId10"/>
+    <p:sldId id="265" r:id="rId11"/>
+    <p:sldId id="266" r:id="rId12"/>
+    <p:sldId id="267" r:id="rId13"/>
+    <p:sldId id="268" r:id="rId14"/>
   </p:sldIdLst>
   <p:sldSz cx="12192000" cy="6858000"/>
   <p:notesSz cx="6858000" cy="9144000"/>
@@ -105,6 +116,11 @@
       </a:defRPr>
     </a:lvl9pPr>
   </p:defaultTextStyle>
+  <p:extLst>
+    <p:ext uri="{EFAFB233-063F-42B5-8137-9DF3F51BA10A}">
+      <p15:sldGuideLst xmlns:p15="http://schemas.microsoft.com/office/powerpoint/2012/main"/>
+    </p:ext>
+  </p:extLst>
 </p:presentation>
 </file>
 
@@ -203,7 +219,7 @@
           <a:effectLst/>
           <a:extLst>
             <a:ext uri="{91240B29-F687-4f45-9708-019B960494DF}">
-              <a14:hiddenLine xmlns:a14="http://schemas.microsoft.com/office/drawing/2010/main" xmlns="" w="9525">
+              <a14:hiddenLine xmlns="" xmlns:a14="http://schemas.microsoft.com/office/drawing/2010/main" w="9525">
                 <a:solidFill>
                   <a:srgbClr val="000000"/>
                 </a:solidFill>
@@ -1713,7 +1729,7 @@
           <a:ln/>
           <a:extLst>
             <a:ext uri="{91240B29-F687-4f45-9708-019B960494DF}">
-              <a14:hiddenLine xmlns:a14="http://schemas.microsoft.com/office/drawing/2010/main" xmlns="" w="9525">
+              <a14:hiddenLine xmlns="" xmlns:a14="http://schemas.microsoft.com/office/drawing/2010/main" w="9525">
                 <a:solidFill>
                   <a:srgbClr val="000000"/>
                 </a:solidFill>
@@ -1985,7 +2001,7 @@
           <a:ln/>
           <a:extLst>
             <a:ext uri="{91240B29-F687-4f45-9708-019B960494DF}">
-              <a14:hiddenLine xmlns:a14="http://schemas.microsoft.com/office/drawing/2010/main" xmlns="" w="9525">
+              <a14:hiddenLine xmlns="" xmlns:a14="http://schemas.microsoft.com/office/drawing/2010/main" w="9525">
                 <a:solidFill>
                   <a:srgbClr val="000000"/>
                 </a:solidFill>
@@ -2265,7 +2281,7 @@
           <a:ln/>
           <a:extLst>
             <a:ext uri="{91240B29-F687-4f45-9708-019B960494DF}">
-              <a14:hiddenLine xmlns:a14="http://schemas.microsoft.com/office/drawing/2010/main" xmlns="" w="9525">
+              <a14:hiddenLine xmlns="" xmlns:a14="http://schemas.microsoft.com/office/drawing/2010/main" w="9525">
                 <a:solidFill>
                   <a:srgbClr val="000000"/>
                 </a:solidFill>
@@ -2885,7 +2901,7 @@
           <a:ln/>
           <a:extLst>
             <a:ext uri="{91240B29-F687-4f45-9708-019B960494DF}">
-              <a14:hiddenLine xmlns:a14="http://schemas.microsoft.com/office/drawing/2010/main" xmlns="" w="9525">
+              <a14:hiddenLine xmlns="" xmlns:a14="http://schemas.microsoft.com/office/drawing/2010/main" w="9525">
                 <a:solidFill>
                   <a:srgbClr val="000000"/>
                 </a:solidFill>
@@ -3221,7 +3237,7 @@
           <a:ln/>
           <a:extLst>
             <a:ext uri="{91240B29-F687-4f45-9708-019B960494DF}">
-              <a14:hiddenLine xmlns:a14="http://schemas.microsoft.com/office/drawing/2010/main" xmlns="" w="9525">
+              <a14:hiddenLine xmlns="" xmlns:a14="http://schemas.microsoft.com/office/drawing/2010/main" w="9525">
                 <a:solidFill>
                   <a:srgbClr val="000000"/>
                 </a:solidFill>
@@ -3695,7 +3711,7 @@
           <a:ln/>
           <a:extLst>
             <a:ext uri="{91240B29-F687-4f45-9708-019B960494DF}">
-              <a14:hiddenLine xmlns:a14="http://schemas.microsoft.com/office/drawing/2010/main" xmlns="" w="9525">
+              <a14:hiddenLine xmlns="" xmlns:a14="http://schemas.microsoft.com/office/drawing/2010/main" w="9525">
                 <a:solidFill>
                   <a:srgbClr val="000000"/>
                 </a:solidFill>
@@ -4118,7 +4134,7 @@
           <a:ln/>
           <a:extLst>
             <a:ext uri="{91240B29-F687-4f45-9708-019B960494DF}">
-              <a14:hiddenLine xmlns:a14="http://schemas.microsoft.com/office/drawing/2010/main" xmlns="" w="9525">
+              <a14:hiddenLine xmlns="" xmlns:a14="http://schemas.microsoft.com/office/drawing/2010/main" w="9525">
                 <a:solidFill>
                   <a:srgbClr val="000000"/>
                 </a:solidFill>
@@ -5382,7 +5398,12 @@
             <p:ph type="subTitle" idx="1"/>
           </p:nvPr>
         </p:nvSpPr>
-        <p:spPr/>
+        <p:spPr>
+          <a:xfrm>
+            <a:off x="810001" y="5280847"/>
+            <a:ext cx="7583501" cy="434974"/>
+          </a:xfrm>
+        </p:spPr>
         <p:txBody>
           <a:bodyPr/>
           <a:lstStyle/>
@@ -5399,6 +5420,429 @@
     <p:extLst>
       <p:ext uri="{BB962C8B-B14F-4D97-AF65-F5344CB8AC3E}">
         <p14:creationId xmlns:p14="http://schemas.microsoft.com/office/powerpoint/2010/main" val="3291405575"/>
+      </p:ext>
+    </p:extLst>
+  </p:cSld>
+  <p:clrMapOvr>
+    <a:masterClrMapping/>
+  </p:clrMapOvr>
+  <p:timing>
+    <p:tnLst>
+      <p:par>
+        <p:cTn id="1" dur="indefinite" restart="never" nodeType="tmRoot"/>
+      </p:par>
+    </p:tnLst>
+  </p:timing>
+</p:sld>
+</file>
+
+<file path=ppt/slides/slide10.xml><?xml version="1.0" encoding="utf-8"?>
+<p:sld xmlns:a="http://schemas.openxmlformats.org/drawingml/2006/main" xmlns:r="http://schemas.openxmlformats.org/officeDocument/2006/relationships" xmlns:p="http://schemas.openxmlformats.org/presentationml/2006/main">
+  <p:cSld>
+    <p:spTree>
+      <p:nvGrpSpPr>
+        <p:cNvPr id="1" name=""/>
+        <p:cNvGrpSpPr/>
+        <p:nvPr/>
+      </p:nvGrpSpPr>
+      <p:grpSpPr>
+        <a:xfrm>
+          <a:off x="0" y="0"/>
+          <a:ext cx="0" cy="0"/>
+          <a:chOff x="0" y="0"/>
+          <a:chExt cx="0" cy="0"/>
+        </a:xfrm>
+      </p:grpSpPr>
+      <p:sp>
+        <p:nvSpPr>
+          <p:cNvPr id="2" name="Title 1"/>
+          <p:cNvSpPr>
+            <a:spLocks noGrp="1"/>
+          </p:cNvSpPr>
+          <p:nvPr>
+            <p:ph type="title"/>
+          </p:nvPr>
+        </p:nvSpPr>
+        <p:spPr/>
+        <p:txBody>
+          <a:bodyPr/>
+          <a:lstStyle/>
+          <a:p>
+            <a:r>
+              <a:rPr lang="sr-Cyrl-RS" dirty="0" smtClean="0"/>
+              <a:t>Спровођење идеја - резултат</a:t>
+            </a:r>
+            <a:endParaRPr lang="en-US" dirty="0"/>
+          </a:p>
+        </p:txBody>
+      </p:sp>
+      <p:pic>
+        <p:nvPicPr>
+          <p:cNvPr id="3" name="Picture 2"/>
+          <p:cNvPicPr/>
+          <p:nvPr/>
+        </p:nvPicPr>
+        <p:blipFill>
+          <a:blip r:embed="rId2">
+            <a:extLst>
+              <a:ext uri="{28A0092B-C50C-407E-A947-70E740481C1C}">
+                <a14:useLocalDpi xmlns:a14="http://schemas.microsoft.com/office/drawing/2010/main" val="0"/>
+              </a:ext>
+            </a:extLst>
+          </a:blip>
+          <a:stretch>
+            <a:fillRect/>
+          </a:stretch>
+        </p:blipFill>
+        <p:spPr>
+          <a:xfrm>
+            <a:off x="3124199" y="2670228"/>
+            <a:ext cx="5943600" cy="3363595"/>
+          </a:xfrm>
+          <a:prstGeom prst="rect">
+            <a:avLst/>
+          </a:prstGeom>
+        </p:spPr>
+      </p:pic>
+    </p:spTree>
+    <p:extLst>
+      <p:ext uri="{BB962C8B-B14F-4D97-AF65-F5344CB8AC3E}">
+        <p14:creationId xmlns:p14="http://schemas.microsoft.com/office/powerpoint/2010/main" val="198923292"/>
+      </p:ext>
+    </p:extLst>
+  </p:cSld>
+  <p:clrMapOvr>
+    <a:masterClrMapping/>
+  </p:clrMapOvr>
+</p:sld>
+</file>
+
+<file path=ppt/slides/slide11.xml><?xml version="1.0" encoding="utf-8"?>
+<p:sld xmlns:a="http://schemas.openxmlformats.org/drawingml/2006/main" xmlns:r="http://schemas.openxmlformats.org/officeDocument/2006/relationships" xmlns:p="http://schemas.openxmlformats.org/presentationml/2006/main">
+  <p:cSld>
+    <p:spTree>
+      <p:nvGrpSpPr>
+        <p:cNvPr id="1" name=""/>
+        <p:cNvGrpSpPr/>
+        <p:nvPr/>
+      </p:nvGrpSpPr>
+      <p:grpSpPr>
+        <a:xfrm>
+          <a:off x="0" y="0"/>
+          <a:ext cx="0" cy="0"/>
+          <a:chOff x="0" y="0"/>
+          <a:chExt cx="0" cy="0"/>
+        </a:xfrm>
+      </p:grpSpPr>
+      <p:sp>
+        <p:nvSpPr>
+          <p:cNvPr id="2" name="Title 1"/>
+          <p:cNvSpPr>
+            <a:spLocks noGrp="1"/>
+          </p:cNvSpPr>
+          <p:nvPr>
+            <p:ph type="title"/>
+          </p:nvPr>
+        </p:nvSpPr>
+        <p:spPr/>
+        <p:txBody>
+          <a:bodyPr/>
+          <a:lstStyle/>
+          <a:p>
+            <a:r>
+              <a:rPr lang="sr-Cyrl-RS" dirty="0" smtClean="0"/>
+              <a:t>Резиме</a:t>
+            </a:r>
+            <a:endParaRPr lang="en-US" dirty="0"/>
+          </a:p>
+        </p:txBody>
+      </p:sp>
+      <p:sp>
+        <p:nvSpPr>
+          <p:cNvPr id="3" name="Content Placeholder 2"/>
+          <p:cNvSpPr>
+            <a:spLocks noGrp="1"/>
+          </p:cNvSpPr>
+          <p:nvPr>
+            <p:ph idx="1"/>
+          </p:nvPr>
+        </p:nvSpPr>
+        <p:spPr/>
+        <p:txBody>
+          <a:bodyPr/>
+          <a:lstStyle/>
+          <a:p>
+            <a:r>
+              <a:rPr lang="sr-Cyrl-RS" dirty="0" smtClean="0"/>
+              <a:t>Рад је у току! (није све имплементирано)</a:t>
+            </a:r>
+          </a:p>
+          <a:p>
+            <a:r>
+              <a:rPr lang="sr-Cyrl-RS" dirty="0" smtClean="0"/>
+              <a:t>Остварена основна идеја, постигнута архитектура која је стабилна</a:t>
+            </a:r>
+          </a:p>
+          <a:p>
+            <a:r>
+              <a:rPr lang="sr-Cyrl-RS" dirty="0" smtClean="0"/>
+              <a:t>Интерфејс је једноставан и прилагодљив</a:t>
+            </a:r>
+          </a:p>
+          <a:p>
+            <a:r>
+              <a:rPr lang="sr-Cyrl-RS" dirty="0" smtClean="0"/>
+              <a:t>Код је отворен</a:t>
+            </a:r>
+            <a:r>
+              <a:rPr lang="sr-Latn-RS" dirty="0"/>
+              <a:t>: </a:t>
+            </a:r>
+            <a:r>
+              <a:rPr lang="sr-Latn-RS" dirty="0">
+                <a:hlinkClick r:id="rId2"/>
+              </a:rPr>
+              <a:t>https://</a:t>
+            </a:r>
+            <a:r>
+              <a:rPr lang="sr-Latn-RS" dirty="0" smtClean="0">
+                <a:hlinkClick r:id="rId2"/>
+              </a:rPr>
+              <a:t>github.com/RazvojSoftvera2/MasterAudioTechnologyFunctions.git</a:t>
+            </a:r>
+            <a:endParaRPr lang="sr-Latn-RS" dirty="0" smtClean="0"/>
+          </a:p>
+          <a:p>
+            <a:r>
+              <a:rPr lang="sr-Cyrl-RS" dirty="0" smtClean="0"/>
+              <a:t>Свако може да учествује, коментарима, коришћењем, предлозима (контакт: </a:t>
+            </a:r>
+            <a:r>
+              <a:rPr lang="en-US" dirty="0" smtClean="0">
+                <a:hlinkClick r:id="rId3"/>
+              </a:rPr>
+              <a:t>djapedja@gmail.com</a:t>
+            </a:r>
+            <a:r>
+              <a:rPr lang="en-US" dirty="0" smtClean="0"/>
+              <a:t>, </a:t>
+            </a:r>
+            <a:r>
+              <a:rPr lang="en-US" dirty="0" smtClean="0">
+                <a:hlinkClick r:id="rId4"/>
+              </a:rPr>
+              <a:t>musasabi333@gmail.com</a:t>
+            </a:r>
+            <a:r>
+              <a:rPr lang="en-US" dirty="0" smtClean="0"/>
+              <a:t>, </a:t>
+            </a:r>
+            <a:r>
+              <a:rPr lang="en-US" dirty="0">
+                <a:hlinkClick r:id="rId5"/>
+              </a:rPr>
+              <a:t>djuronenadovic@gmail.com</a:t>
+            </a:r>
+            <a:r>
+              <a:rPr lang="sr-Cyrl-RS" dirty="0" smtClean="0"/>
+              <a:t>)</a:t>
+            </a:r>
+            <a:endParaRPr lang="en-GB" dirty="0" smtClean="0"/>
+          </a:p>
+        </p:txBody>
+      </p:sp>
+    </p:spTree>
+    <p:extLst>
+      <p:ext uri="{BB962C8B-B14F-4D97-AF65-F5344CB8AC3E}">
+        <p14:creationId xmlns:p14="http://schemas.microsoft.com/office/powerpoint/2010/main" val="1499646161"/>
+      </p:ext>
+    </p:extLst>
+  </p:cSld>
+  <p:clrMapOvr>
+    <a:masterClrMapping/>
+  </p:clrMapOvr>
+</p:sld>
+</file>
+
+<file path=ppt/slides/slide12.xml><?xml version="1.0" encoding="utf-8"?>
+<p:sld xmlns:a="http://schemas.openxmlformats.org/drawingml/2006/main" xmlns:r="http://schemas.openxmlformats.org/officeDocument/2006/relationships" xmlns:p="http://schemas.openxmlformats.org/presentationml/2006/main">
+  <p:cSld>
+    <p:spTree>
+      <p:nvGrpSpPr>
+        <p:cNvPr id="1" name=""/>
+        <p:cNvGrpSpPr/>
+        <p:nvPr/>
+      </p:nvGrpSpPr>
+      <p:grpSpPr>
+        <a:xfrm>
+          <a:off x="0" y="0"/>
+          <a:ext cx="0" cy="0"/>
+          <a:chOff x="0" y="0"/>
+          <a:chExt cx="0" cy="0"/>
+        </a:xfrm>
+      </p:grpSpPr>
+      <p:sp>
+        <p:nvSpPr>
+          <p:cNvPr id="2" name="Title 1"/>
+          <p:cNvSpPr>
+            <a:spLocks noGrp="1"/>
+          </p:cNvSpPr>
+          <p:nvPr>
+            <p:ph type="title"/>
+          </p:nvPr>
+        </p:nvSpPr>
+        <p:spPr/>
+        <p:txBody>
+          <a:bodyPr/>
+          <a:lstStyle/>
+          <a:p>
+            <a:r>
+              <a:rPr lang="sr-Cyrl-RS" dirty="0" smtClean="0"/>
+              <a:t>Закључак</a:t>
+            </a:r>
+            <a:endParaRPr lang="en-US" dirty="0"/>
+          </a:p>
+        </p:txBody>
+      </p:sp>
+      <p:sp>
+        <p:nvSpPr>
+          <p:cNvPr id="3" name="Content Placeholder 2"/>
+          <p:cNvSpPr>
+            <a:spLocks noGrp="1"/>
+          </p:cNvSpPr>
+          <p:nvPr>
+            <p:ph idx="1"/>
+          </p:nvPr>
+        </p:nvSpPr>
+        <p:spPr/>
+        <p:txBody>
+          <a:bodyPr/>
+          <a:lstStyle/>
+          <a:p>
+            <a:r>
+              <a:rPr lang="sr-Cyrl-RS" dirty="0" smtClean="0"/>
+              <a:t>Први део пројекта остварен, следи унапређивање</a:t>
+            </a:r>
+          </a:p>
+          <a:p>
+            <a:r>
+              <a:rPr lang="sr-Cyrl-RS" dirty="0" smtClean="0"/>
+              <a:t>Могуће је било спровести све од почетка (али да ли би ишта могли да покажемо данас?)</a:t>
+            </a:r>
+          </a:p>
+          <a:p>
+            <a:r>
+              <a:rPr lang="sr-Cyrl-RS" dirty="0" smtClean="0"/>
+              <a:t>Пренадувавање посла у одређеним деловима развоја – неки спринтови су пошли наопако због тога (</a:t>
+            </a:r>
+            <a:r>
+              <a:rPr lang="en-GB" dirty="0" smtClean="0"/>
+              <a:t>pitch </a:t>
+            </a:r>
+            <a:r>
+              <a:rPr lang="sr-Cyrl-RS" dirty="0" smtClean="0"/>
+              <a:t>функционалност)</a:t>
+            </a:r>
+          </a:p>
+          <a:p>
+            <a:r>
+              <a:rPr lang="sr-Cyrl-RS" dirty="0" smtClean="0"/>
+              <a:t>Лоша организованост у одређеним моментима (време, обавезе...)</a:t>
+            </a:r>
+          </a:p>
+          <a:p>
+            <a:r>
+              <a:rPr lang="sr-Cyrl-RS" dirty="0" smtClean="0"/>
+              <a:t>Увек може другачије али да ли је то боље? (могући су другачији приступи, које смо у току мењали али убрзо се дошло до оптималног)</a:t>
+            </a:r>
+            <a:endParaRPr lang="sr-Cyrl-RS" dirty="0"/>
+          </a:p>
+          <a:p>
+            <a:endParaRPr lang="sr-Cyrl-RS" dirty="0" smtClean="0"/>
+          </a:p>
+        </p:txBody>
+      </p:sp>
+    </p:spTree>
+    <p:extLst>
+      <p:ext uri="{BB962C8B-B14F-4D97-AF65-F5344CB8AC3E}">
+        <p14:creationId xmlns:p14="http://schemas.microsoft.com/office/powerpoint/2010/main" val="838642593"/>
+      </p:ext>
+    </p:extLst>
+  </p:cSld>
+  <p:clrMapOvr>
+    <a:masterClrMapping/>
+  </p:clrMapOvr>
+</p:sld>
+</file>
+
+<file path=ppt/slides/slide13.xml><?xml version="1.0" encoding="utf-8"?>
+<p:sld xmlns:a="http://schemas.openxmlformats.org/drawingml/2006/main" xmlns:r="http://schemas.openxmlformats.org/officeDocument/2006/relationships" xmlns:p="http://schemas.openxmlformats.org/presentationml/2006/main">
+  <p:cSld>
+    <p:spTree>
+      <p:nvGrpSpPr>
+        <p:cNvPr id="1" name=""/>
+        <p:cNvGrpSpPr/>
+        <p:nvPr/>
+      </p:nvGrpSpPr>
+      <p:grpSpPr>
+        <a:xfrm>
+          <a:off x="0" y="0"/>
+          <a:ext cx="0" cy="0"/>
+          <a:chOff x="0" y="0"/>
+          <a:chExt cx="0" cy="0"/>
+        </a:xfrm>
+      </p:grpSpPr>
+      <p:sp>
+        <p:nvSpPr>
+          <p:cNvPr id="2" name="Title 1"/>
+          <p:cNvSpPr>
+            <a:spLocks noGrp="1"/>
+          </p:cNvSpPr>
+          <p:nvPr>
+            <p:ph type="title"/>
+          </p:nvPr>
+        </p:nvSpPr>
+        <p:spPr/>
+        <p:txBody>
+          <a:bodyPr/>
+          <a:lstStyle/>
+          <a:p>
+            <a:pPr algn="l"/>
+            <a:r>
+              <a:rPr lang="sr-Cyrl-RS" dirty="0" smtClean="0"/>
+              <a:t>Питања?</a:t>
+            </a:r>
+            <a:endParaRPr lang="en-US" dirty="0"/>
+          </a:p>
+        </p:txBody>
+      </p:sp>
+      <p:sp>
+        <p:nvSpPr>
+          <p:cNvPr id="3" name="Text Placeholder 2"/>
+          <p:cNvSpPr>
+            <a:spLocks noGrp="1"/>
+          </p:cNvSpPr>
+          <p:nvPr>
+            <p:ph type="body" idx="1"/>
+          </p:nvPr>
+        </p:nvSpPr>
+        <p:spPr/>
+        <p:txBody>
+          <a:bodyPr/>
+          <a:lstStyle/>
+          <a:p>
+            <a:r>
+              <a:rPr lang="sr-Cyrl-RS" dirty="0" smtClean="0"/>
+              <a:t>Следи практична презентација...</a:t>
+            </a:r>
+            <a:endParaRPr lang="en-US" dirty="0"/>
+          </a:p>
+        </p:txBody>
+      </p:sp>
+    </p:spTree>
+    <p:extLst>
+      <p:ext uri="{BB962C8B-B14F-4D97-AF65-F5344CB8AC3E}">
+        <p14:creationId xmlns:p14="http://schemas.microsoft.com/office/powerpoint/2010/main" val="288630908"/>
       </p:ext>
     </p:extLst>
   </p:cSld>
@@ -5494,7 +5938,7 @@
           </a:p>
           <a:p>
             <a:r>
-              <a:rPr lang="sr-Cyrl-RS"/>
+              <a:rPr lang="sr-Cyrl-RS" dirty="0"/>
               <a:t>Питања</a:t>
             </a:r>
             <a:endParaRPr lang="sr-Latn-RS" dirty="0"/>
@@ -5505,6 +5949,1161 @@
     <p:extLst>
       <p:ext uri="{BB962C8B-B14F-4D97-AF65-F5344CB8AC3E}">
         <p14:creationId xmlns:p14="http://schemas.microsoft.com/office/powerpoint/2010/main" val="647422255"/>
+      </p:ext>
+    </p:extLst>
+  </p:cSld>
+  <p:clrMapOvr>
+    <a:masterClrMapping/>
+  </p:clrMapOvr>
+  <p:timing>
+    <p:tnLst>
+      <p:par>
+        <p:cTn id="1" dur="indefinite" restart="never" nodeType="tmRoot"/>
+      </p:par>
+    </p:tnLst>
+  </p:timing>
+</p:sld>
+</file>
+
+<file path=ppt/slides/slide3.xml><?xml version="1.0" encoding="utf-8"?>
+<p:sld xmlns:a="http://schemas.openxmlformats.org/drawingml/2006/main" xmlns:r="http://schemas.openxmlformats.org/officeDocument/2006/relationships" xmlns:p="http://schemas.openxmlformats.org/presentationml/2006/main">
+  <p:cSld>
+    <p:spTree>
+      <p:nvGrpSpPr>
+        <p:cNvPr id="1" name=""/>
+        <p:cNvGrpSpPr/>
+        <p:nvPr/>
+      </p:nvGrpSpPr>
+      <p:grpSpPr>
+        <a:xfrm>
+          <a:off x="0" y="0"/>
+          <a:ext cx="0" cy="0"/>
+          <a:chOff x="0" y="0"/>
+          <a:chExt cx="0" cy="0"/>
+        </a:xfrm>
+      </p:grpSpPr>
+      <p:sp>
+        <p:nvSpPr>
+          <p:cNvPr id="2" name="Title 1"/>
+          <p:cNvSpPr>
+            <a:spLocks noGrp="1"/>
+          </p:cNvSpPr>
+          <p:nvPr>
+            <p:ph type="title"/>
+          </p:nvPr>
+        </p:nvSpPr>
+        <p:spPr/>
+        <p:txBody>
+          <a:bodyPr/>
+          <a:lstStyle/>
+          <a:p>
+            <a:r>
+              <a:rPr lang="sr-Cyrl-RS" dirty="0" smtClean="0"/>
+              <a:t>Шта је и чему служи?</a:t>
+            </a:r>
+            <a:endParaRPr lang="en-US" dirty="0"/>
+          </a:p>
+        </p:txBody>
+      </p:sp>
+      <p:sp>
+        <p:nvSpPr>
+          <p:cNvPr id="3" name="Content Placeholder 2"/>
+          <p:cNvSpPr>
+            <a:spLocks noGrp="1"/>
+          </p:cNvSpPr>
+          <p:nvPr>
+            <p:ph idx="1"/>
+          </p:nvPr>
+        </p:nvSpPr>
+        <p:spPr/>
+        <p:txBody>
+          <a:bodyPr/>
+          <a:lstStyle/>
+          <a:p>
+            <a:r>
+              <a:rPr lang="sr-Cyrl-RS" dirty="0" smtClean="0"/>
+              <a:t>Различите манипулације аудио записима (пуштање, графички приказ, комбиновање више аудио записа у један...)</a:t>
+            </a:r>
+          </a:p>
+          <a:p>
+            <a:r>
+              <a:rPr lang="sr-Cyrl-RS" dirty="0" smtClean="0"/>
+              <a:t>Треба да буде једноставна, отвореног кода, бесплатна</a:t>
+            </a:r>
+          </a:p>
+          <a:p>
+            <a:r>
+              <a:rPr lang="sr-Cyrl-RS" dirty="0" smtClean="0"/>
+              <a:t>Намењена је аматерима и почетницима који треба да стекну осећај у раду са аудио записима</a:t>
+            </a:r>
+          </a:p>
+          <a:p>
+            <a:r>
+              <a:rPr lang="sr-Cyrl-RS" dirty="0" smtClean="0"/>
+              <a:t>Треба да подржава најпопуларније формате аудио записа (тренутно </a:t>
+            </a:r>
+            <a:r>
+              <a:rPr lang="en-GB" dirty="0" smtClean="0"/>
+              <a:t>wav</a:t>
+            </a:r>
+            <a:r>
+              <a:rPr lang="sr-Latn-RS" dirty="0" smtClean="0"/>
+              <a:t> </a:t>
+            </a:r>
+            <a:r>
+              <a:rPr lang="sr-Cyrl-RS" dirty="0" smtClean="0"/>
+              <a:t>и</a:t>
+            </a:r>
+            <a:r>
+              <a:rPr lang="en-GB" dirty="0" smtClean="0"/>
+              <a:t> </a:t>
+            </a:r>
+            <a:r>
+              <a:rPr lang="sr-Latn-RS" dirty="0" smtClean="0"/>
+              <a:t>mp3</a:t>
+            </a:r>
+            <a:r>
+              <a:rPr lang="sr-Cyrl-RS" dirty="0" smtClean="0"/>
+              <a:t>)</a:t>
+            </a:r>
+          </a:p>
+          <a:p>
+            <a:r>
+              <a:rPr lang="sr-Cyrl-RS" dirty="0" smtClean="0"/>
+              <a:t>Служи за мењање постојећих аудио записа као и за стварање нових</a:t>
+            </a:r>
+            <a:endParaRPr lang="en-US" dirty="0"/>
+          </a:p>
+        </p:txBody>
+      </p:sp>
+    </p:spTree>
+    <p:extLst>
+      <p:ext uri="{BB962C8B-B14F-4D97-AF65-F5344CB8AC3E}">
+        <p14:creationId xmlns:p14="http://schemas.microsoft.com/office/powerpoint/2010/main" val="3587410872"/>
+      </p:ext>
+    </p:extLst>
+  </p:cSld>
+  <p:clrMapOvr>
+    <a:masterClrMapping/>
+  </p:clrMapOvr>
+  <p:timing>
+    <p:tnLst>
+      <p:par>
+        <p:cTn id="1" dur="indefinite" restart="never" nodeType="tmRoot"/>
+      </p:par>
+    </p:tnLst>
+  </p:timing>
+</p:sld>
+</file>
+
+<file path=ppt/slides/slide4.xml><?xml version="1.0" encoding="utf-8"?>
+<p:sld xmlns:a="http://schemas.openxmlformats.org/drawingml/2006/main" xmlns:r="http://schemas.openxmlformats.org/officeDocument/2006/relationships" xmlns:p="http://schemas.openxmlformats.org/presentationml/2006/main">
+  <p:cSld>
+    <p:spTree>
+      <p:nvGrpSpPr>
+        <p:cNvPr id="1" name=""/>
+        <p:cNvGrpSpPr/>
+        <p:nvPr/>
+      </p:nvGrpSpPr>
+      <p:grpSpPr>
+        <a:xfrm>
+          <a:off x="0" y="0"/>
+          <a:ext cx="0" cy="0"/>
+          <a:chOff x="0" y="0"/>
+          <a:chExt cx="0" cy="0"/>
+        </a:xfrm>
+      </p:grpSpPr>
+      <p:sp>
+        <p:nvSpPr>
+          <p:cNvPr id="2" name="Title 1"/>
+          <p:cNvSpPr>
+            <a:spLocks noGrp="1"/>
+          </p:cNvSpPr>
+          <p:nvPr>
+            <p:ph type="title"/>
+          </p:nvPr>
+        </p:nvSpPr>
+        <p:spPr/>
+        <p:txBody>
+          <a:bodyPr/>
+          <a:lstStyle/>
+          <a:p>
+            <a:r>
+              <a:rPr lang="sr-Cyrl-RS" dirty="0" smtClean="0"/>
+              <a:t>Идејна решења – база?</a:t>
+            </a:r>
+            <a:endParaRPr lang="en-US" dirty="0"/>
+          </a:p>
+        </p:txBody>
+      </p:sp>
+      <p:sp>
+        <p:nvSpPr>
+          <p:cNvPr id="3" name="Rectangle 2"/>
+          <p:cNvSpPr>
+            <a:spLocks noChangeArrowheads="1"/>
+          </p:cNvSpPr>
+          <p:nvPr/>
+        </p:nvSpPr>
+        <p:spPr bwMode="auto">
+          <a:xfrm>
+            <a:off x="3856007" y="3088256"/>
+            <a:ext cx="12192000" cy="0"/>
+          </a:xfrm>
+          <a:prstGeom prst="rect">
+            <a:avLst/>
+          </a:prstGeom>
+          <a:noFill/>
+          <a:ln>
+            <a:noFill/>
+          </a:ln>
+          <a:effectLst/>
+          <a:extLst>
+            <a:ext uri="{909E8E84-426E-40DD-AFC4-6F175D3DCCD1}">
+              <a14:hiddenFill xmlns:a14="http://schemas.microsoft.com/office/drawing/2010/main">
+                <a:solidFill>
+                  <a:schemeClr val="accent1"/>
+                </a:solidFill>
+              </a14:hiddenFill>
+            </a:ext>
+            <a:ext uri="{91240B29-F687-4F45-9708-019B960494DF}">
+              <a14:hiddenLine xmlns:a14="http://schemas.microsoft.com/office/drawing/2010/main" w="9525">
+                <a:solidFill>
+                  <a:schemeClr val="tx1"/>
+                </a:solidFill>
+                <a:miter lim="800000"/>
+                <a:headEnd/>
+                <a:tailEnd/>
+              </a14:hiddenLine>
+            </a:ext>
+            <a:ext uri="{AF507438-7753-43E0-B8FC-AC1667EBCBE1}">
+              <a14:hiddenEffects xmlns:a14="http://schemas.microsoft.com/office/drawing/2010/main">
+                <a:effectLst>
+                  <a:outerShdw dist="35921" dir="2700000" algn="ctr" rotWithShape="0">
+                    <a:schemeClr val="bg2"/>
+                  </a:outerShdw>
+                </a:effectLst>
+              </a14:hiddenEffects>
+            </a:ext>
+          </a:extLst>
+        </p:spPr>
+        <p:txBody>
+          <a:bodyPr vert="horz" wrap="none" lIns="91440" tIns="45720" rIns="91440" bIns="45720" numCol="1" anchor="ctr" anchorCtr="0" compatLnSpc="1">
+            <a:prstTxWarp prst="textNoShape">
+              <a:avLst/>
+            </a:prstTxWarp>
+            <a:spAutoFit/>
+          </a:bodyPr>
+          <a:lstStyle/>
+          <a:p>
+            <a:endParaRPr lang="en-US"/>
+          </a:p>
+        </p:txBody>
+      </p:sp>
+      <p:graphicFrame>
+        <p:nvGraphicFramePr>
+          <p:cNvPr id="4" name="Object 3"/>
+          <p:cNvGraphicFramePr>
+            <a:graphicFrameLocks noChangeAspect="1"/>
+          </p:cNvGraphicFramePr>
+          <p:nvPr>
+            <p:extLst>
+              <p:ext uri="{D42A27DB-BD31-4B8C-83A1-F6EECF244321}">
+                <p14:modId xmlns:p14="http://schemas.microsoft.com/office/powerpoint/2010/main" val="1522628780"/>
+              </p:ext>
+            </p:extLst>
+          </p:nvPr>
+        </p:nvGraphicFramePr>
+        <p:xfrm>
+          <a:off x="7970807" y="2777705"/>
+          <a:ext cx="3825875" cy="2552700"/>
+        </p:xfrm>
+        <a:graphic>
+          <a:graphicData uri="http://schemas.openxmlformats.org/presentationml/2006/ole">
+            <mc:AlternateContent xmlns:mc="http://schemas.openxmlformats.org/markup-compatibility/2006">
+              <mc:Choice xmlns:v="urn:schemas-microsoft-com:vml" Requires="v">
+                <p:oleObj spid="_x0000_s1058" r:id="rId3" imgW="3827699" imgH="2555041" progId="Visio.Drawing.15">
+                  <p:embed/>
+                </p:oleObj>
+              </mc:Choice>
+              <mc:Fallback>
+                <p:oleObj r:id="rId3" imgW="3827699" imgH="2555041" progId="Visio.Drawing.15">
+                  <p:embed/>
+                  <p:pic>
+                    <p:nvPicPr>
+                      <p:cNvPr id="0" name="Object 1"/>
+                      <p:cNvPicPr>
+                        <a:picLocks noChangeAspect="1" noChangeArrowheads="1"/>
+                      </p:cNvPicPr>
+                      <p:nvPr/>
+                    </p:nvPicPr>
+                    <p:blipFill>
+                      <a:blip r:embed="rId4">
+                        <a:extLst>
+                          <a:ext uri="{28A0092B-C50C-407E-A947-70E740481C1C}">
+                            <a14:useLocalDpi xmlns:a14="http://schemas.microsoft.com/office/drawing/2010/main" val="0"/>
+                          </a:ext>
+                        </a:extLst>
+                      </a:blip>
+                      <a:srcRect/>
+                      <a:stretch>
+                        <a:fillRect/>
+                      </a:stretch>
+                    </p:blipFill>
+                    <p:spPr bwMode="auto">
+                      <a:xfrm>
+                        <a:off x="7970807" y="2777705"/>
+                        <a:ext cx="3825875" cy="2552700"/>
+                      </a:xfrm>
+                      <a:prstGeom prst="rect">
+                        <a:avLst/>
+                      </a:prstGeom>
+                      <a:noFill/>
+                      <a:extLst>
+                        <a:ext uri="{909E8E84-426E-40DD-AFC4-6F175D3DCCD1}">
+                          <a14:hiddenFill xmlns:a14="http://schemas.microsoft.com/office/drawing/2010/main">
+                            <a:solidFill>
+                              <a:srgbClr val="FFFFFF"/>
+                            </a:solidFill>
+                          </a14:hiddenFill>
+                        </a:ext>
+                      </a:extLst>
+                    </p:spPr>
+                  </p:pic>
+                </p:oleObj>
+              </mc:Fallback>
+            </mc:AlternateContent>
+          </a:graphicData>
+        </a:graphic>
+      </p:graphicFrame>
+      <p:sp>
+        <p:nvSpPr>
+          <p:cNvPr id="5" name="Content Placeholder 2"/>
+          <p:cNvSpPr txBox="1">
+            <a:spLocks/>
+          </p:cNvSpPr>
+          <p:nvPr/>
+        </p:nvSpPr>
+        <p:spPr>
+          <a:xfrm>
+            <a:off x="818712" y="2863970"/>
+            <a:ext cx="6315333" cy="2820838"/>
+          </a:xfrm>
+          <a:prstGeom prst="rect">
+            <a:avLst/>
+          </a:prstGeom>
+        </p:spPr>
+        <p:txBody>
+          <a:bodyPr/>
+          <a:lstStyle>
+            <a:lvl1pPr marL="342900" indent="-342900" algn="l" defTabSz="457200" rtl="0" eaLnBrk="1" latinLnBrk="0" hangingPunct="1">
+              <a:spcBef>
+                <a:spcPct val="20000"/>
+              </a:spcBef>
+              <a:spcAft>
+                <a:spcPts val="600"/>
+              </a:spcAft>
+              <a:buClr>
+                <a:schemeClr val="accent1"/>
+              </a:buClr>
+              <a:buFont typeface="Wingdings 2" charset="2"/>
+              <a:buChar char=""/>
+              <a:defRPr sz="1800" kern="1200">
+                <a:solidFill>
+                  <a:schemeClr val="tx1"/>
+                </a:solidFill>
+                <a:latin typeface="+mn-lt"/>
+                <a:ea typeface="+mn-ea"/>
+                <a:cs typeface="+mn-cs"/>
+              </a:defRPr>
+            </a:lvl1pPr>
+            <a:lvl2pPr marL="742950" indent="-285750" algn="l" defTabSz="457200" rtl="0" eaLnBrk="1" latinLnBrk="0" hangingPunct="1">
+              <a:spcBef>
+                <a:spcPct val="20000"/>
+              </a:spcBef>
+              <a:spcAft>
+                <a:spcPts val="600"/>
+              </a:spcAft>
+              <a:buClr>
+                <a:schemeClr val="accent1"/>
+              </a:buClr>
+              <a:buFont typeface="Wingdings 2" charset="2"/>
+              <a:buChar char=""/>
+              <a:defRPr sz="1600" kern="1200">
+                <a:solidFill>
+                  <a:schemeClr val="tx1"/>
+                </a:solidFill>
+                <a:latin typeface="+mn-lt"/>
+                <a:ea typeface="+mn-ea"/>
+                <a:cs typeface="+mn-cs"/>
+              </a:defRPr>
+            </a:lvl2pPr>
+            <a:lvl3pPr marL="1143000" indent="-228600" algn="l" defTabSz="457200" rtl="0" eaLnBrk="1" latinLnBrk="0" hangingPunct="1">
+              <a:spcBef>
+                <a:spcPct val="20000"/>
+              </a:spcBef>
+              <a:spcAft>
+                <a:spcPts val="600"/>
+              </a:spcAft>
+              <a:buClr>
+                <a:schemeClr val="accent1"/>
+              </a:buClr>
+              <a:buFont typeface="Wingdings 2" charset="2"/>
+              <a:buChar char=""/>
+              <a:defRPr sz="1400" kern="1200">
+                <a:solidFill>
+                  <a:schemeClr val="tx1"/>
+                </a:solidFill>
+                <a:latin typeface="+mn-lt"/>
+                <a:ea typeface="+mn-ea"/>
+                <a:cs typeface="+mn-cs"/>
+              </a:defRPr>
+            </a:lvl3pPr>
+            <a:lvl4pPr marL="1600200" indent="-228600" algn="l" defTabSz="457200" rtl="0" eaLnBrk="1" latinLnBrk="0" hangingPunct="1">
+              <a:spcBef>
+                <a:spcPct val="20000"/>
+              </a:spcBef>
+              <a:spcAft>
+                <a:spcPts val="600"/>
+              </a:spcAft>
+              <a:buClr>
+                <a:schemeClr val="accent1"/>
+              </a:buClr>
+              <a:buFont typeface="Wingdings 2" charset="2"/>
+              <a:buChar char=""/>
+              <a:defRPr sz="1200" kern="1200">
+                <a:solidFill>
+                  <a:schemeClr val="tx1"/>
+                </a:solidFill>
+                <a:latin typeface="+mn-lt"/>
+                <a:ea typeface="+mn-ea"/>
+                <a:cs typeface="+mn-cs"/>
+              </a:defRPr>
+            </a:lvl4pPr>
+            <a:lvl5pPr marL="2057400" indent="-228600" algn="l" defTabSz="457200" rtl="0" eaLnBrk="1" latinLnBrk="0" hangingPunct="1">
+              <a:spcBef>
+                <a:spcPct val="20000"/>
+              </a:spcBef>
+              <a:spcAft>
+                <a:spcPts val="600"/>
+              </a:spcAft>
+              <a:buClr>
+                <a:schemeClr val="accent1"/>
+              </a:buClr>
+              <a:buFont typeface="Wingdings 2" charset="2"/>
+              <a:buChar char=""/>
+              <a:defRPr sz="1200" kern="1200">
+                <a:solidFill>
+                  <a:schemeClr val="tx1"/>
+                </a:solidFill>
+                <a:latin typeface="+mn-lt"/>
+                <a:ea typeface="+mn-ea"/>
+                <a:cs typeface="+mn-cs"/>
+              </a:defRPr>
+            </a:lvl5pPr>
+            <a:lvl6pPr marL="2400000" indent="-228600" algn="l" defTabSz="457200" rtl="0" eaLnBrk="1" latinLnBrk="0" hangingPunct="1">
+              <a:spcBef>
+                <a:spcPct val="20000"/>
+              </a:spcBef>
+              <a:spcAft>
+                <a:spcPts val="600"/>
+              </a:spcAft>
+              <a:buClr>
+                <a:schemeClr val="accent1"/>
+              </a:buClr>
+              <a:buFont typeface="Wingdings 2" charset="2"/>
+              <a:buChar char=""/>
+              <a:defRPr sz="1200" kern="1200">
+                <a:solidFill>
+                  <a:schemeClr val="tx1"/>
+                </a:solidFill>
+                <a:latin typeface="+mn-lt"/>
+                <a:ea typeface="+mn-ea"/>
+                <a:cs typeface="+mn-cs"/>
+              </a:defRPr>
+            </a:lvl6pPr>
+            <a:lvl7pPr marL="2800000" indent="-228600" algn="l" defTabSz="457200" rtl="0" eaLnBrk="1" latinLnBrk="0" hangingPunct="1">
+              <a:spcBef>
+                <a:spcPct val="20000"/>
+              </a:spcBef>
+              <a:spcAft>
+                <a:spcPts val="600"/>
+              </a:spcAft>
+              <a:buClr>
+                <a:schemeClr val="accent1"/>
+              </a:buClr>
+              <a:buFont typeface="Wingdings 2" charset="2"/>
+              <a:buChar char=""/>
+              <a:defRPr sz="1200" kern="1200">
+                <a:solidFill>
+                  <a:schemeClr val="tx1"/>
+                </a:solidFill>
+                <a:latin typeface="+mn-lt"/>
+                <a:ea typeface="+mn-ea"/>
+                <a:cs typeface="+mn-cs"/>
+              </a:defRPr>
+            </a:lvl7pPr>
+            <a:lvl8pPr marL="3200000" indent="-228600" algn="l" defTabSz="457200" rtl="0" eaLnBrk="1" latinLnBrk="0" hangingPunct="1">
+              <a:spcBef>
+                <a:spcPct val="20000"/>
+              </a:spcBef>
+              <a:spcAft>
+                <a:spcPts val="600"/>
+              </a:spcAft>
+              <a:buClr>
+                <a:schemeClr val="accent1"/>
+              </a:buClr>
+              <a:buFont typeface="Wingdings 2" charset="2"/>
+              <a:buChar char=""/>
+              <a:defRPr sz="1200" kern="1200">
+                <a:solidFill>
+                  <a:schemeClr val="tx1"/>
+                </a:solidFill>
+                <a:latin typeface="+mn-lt"/>
+                <a:ea typeface="+mn-ea"/>
+                <a:cs typeface="+mn-cs"/>
+              </a:defRPr>
+            </a:lvl8pPr>
+            <a:lvl9pPr marL="3600000" indent="-228600" algn="l" defTabSz="457200" rtl="0" eaLnBrk="1" latinLnBrk="0" hangingPunct="1">
+              <a:spcBef>
+                <a:spcPct val="20000"/>
+              </a:spcBef>
+              <a:spcAft>
+                <a:spcPts val="600"/>
+              </a:spcAft>
+              <a:buClr>
+                <a:schemeClr val="accent1"/>
+              </a:buClr>
+              <a:buFont typeface="Wingdings 2" charset="2"/>
+              <a:buChar char=""/>
+              <a:defRPr sz="1200" kern="1200">
+                <a:solidFill>
+                  <a:schemeClr val="tx1"/>
+                </a:solidFill>
+                <a:latin typeface="+mn-lt"/>
+                <a:ea typeface="+mn-ea"/>
+                <a:cs typeface="+mn-cs"/>
+              </a:defRPr>
+            </a:lvl9pPr>
+          </a:lstStyle>
+          <a:p>
+            <a:r>
+              <a:rPr lang="sr-Cyrl-RS" dirty="0" smtClean="0"/>
+              <a:t>Да ли нам је заиста потребна база?</a:t>
+            </a:r>
+          </a:p>
+          <a:p>
+            <a:r>
+              <a:rPr lang="sr-Cyrl-RS" dirty="0" smtClean="0"/>
+              <a:t>Нема праве базе</a:t>
+            </a:r>
+          </a:p>
+          <a:p>
+            <a:r>
+              <a:rPr lang="sr-Cyrl-RS" dirty="0" smtClean="0"/>
+              <a:t>Решење је да држимо узорке основних записа у оквиру апликације, и по потреби га надограђујемо</a:t>
+            </a:r>
+          </a:p>
+          <a:p>
+            <a:r>
+              <a:rPr lang="sr-Cyrl-RS" dirty="0" smtClean="0"/>
+              <a:t>Практично фолдер напуњен разним узорцима</a:t>
+            </a:r>
+            <a:endParaRPr lang="sr-Latn-RS" dirty="0"/>
+          </a:p>
+        </p:txBody>
+      </p:sp>
+    </p:spTree>
+    <p:extLst>
+      <p:ext uri="{BB962C8B-B14F-4D97-AF65-F5344CB8AC3E}">
+        <p14:creationId xmlns:p14="http://schemas.microsoft.com/office/powerpoint/2010/main" val="2660447309"/>
+      </p:ext>
+    </p:extLst>
+  </p:cSld>
+  <p:clrMapOvr>
+    <a:masterClrMapping/>
+  </p:clrMapOvr>
+  <p:timing>
+    <p:tnLst>
+      <p:par>
+        <p:cTn id="1" dur="indefinite" restart="never" nodeType="tmRoot"/>
+      </p:par>
+    </p:tnLst>
+  </p:timing>
+</p:sld>
+</file>
+
+<file path=ppt/slides/slide5.xml><?xml version="1.0" encoding="utf-8"?>
+<p:sld xmlns:a="http://schemas.openxmlformats.org/drawingml/2006/main" xmlns:r="http://schemas.openxmlformats.org/officeDocument/2006/relationships" xmlns:p="http://schemas.openxmlformats.org/presentationml/2006/main">
+  <p:cSld>
+    <p:spTree>
+      <p:nvGrpSpPr>
+        <p:cNvPr id="1" name=""/>
+        <p:cNvGrpSpPr/>
+        <p:nvPr/>
+      </p:nvGrpSpPr>
+      <p:grpSpPr>
+        <a:xfrm>
+          <a:off x="0" y="0"/>
+          <a:ext cx="0" cy="0"/>
+          <a:chOff x="0" y="0"/>
+          <a:chExt cx="0" cy="0"/>
+        </a:xfrm>
+      </p:grpSpPr>
+      <p:sp>
+        <p:nvSpPr>
+          <p:cNvPr id="2" name="Title 1"/>
+          <p:cNvSpPr>
+            <a:spLocks noGrp="1"/>
+          </p:cNvSpPr>
+          <p:nvPr>
+            <p:ph type="title"/>
+          </p:nvPr>
+        </p:nvSpPr>
+        <p:spPr/>
+        <p:txBody>
+          <a:bodyPr/>
+          <a:lstStyle/>
+          <a:p>
+            <a:r>
+              <a:rPr lang="sr-Cyrl-RS" dirty="0" smtClean="0"/>
+              <a:t>Идејна решења – управљање записима</a:t>
+            </a:r>
+            <a:endParaRPr lang="en-US" dirty="0"/>
+          </a:p>
+        </p:txBody>
+      </p:sp>
+      <p:sp>
+        <p:nvSpPr>
+          <p:cNvPr id="3" name="Content Placeholder 2"/>
+          <p:cNvSpPr>
+            <a:spLocks noGrp="1"/>
+          </p:cNvSpPr>
+          <p:nvPr>
+            <p:ph idx="1"/>
+          </p:nvPr>
+        </p:nvSpPr>
+        <p:spPr/>
+        <p:txBody>
+          <a:bodyPr/>
+          <a:lstStyle/>
+          <a:p>
+            <a:r>
+              <a:rPr lang="sr-Cyrl-RS" dirty="0" smtClean="0"/>
+              <a:t>Потребна нам је имплементација најнижег нивоа, на нивоу тока записа</a:t>
+            </a:r>
+          </a:p>
+          <a:p>
+            <a:r>
+              <a:rPr lang="sr-Cyrl-RS" dirty="0" smtClean="0"/>
+              <a:t>Узета је библиотека </a:t>
+            </a:r>
+            <a:r>
+              <a:rPr lang="en-GB" dirty="0" smtClean="0"/>
+              <a:t>N</a:t>
+            </a:r>
+            <a:r>
+              <a:rPr lang="sr-Cyrl-RS" dirty="0" smtClean="0"/>
+              <a:t>а</a:t>
+            </a:r>
+            <a:r>
+              <a:rPr lang="en-GB" dirty="0" err="1" smtClean="0"/>
+              <a:t>udio</a:t>
+            </a:r>
+            <a:r>
+              <a:rPr lang="sr-Cyrl-RS" dirty="0" smtClean="0"/>
+              <a:t> (за ГУИ коришћена </a:t>
+            </a:r>
+            <a:r>
+              <a:rPr lang="en-GB" dirty="0" smtClean="0"/>
+              <a:t>metro</a:t>
+            </a:r>
+            <a:r>
+              <a:rPr lang="sr-Latn-RS" dirty="0" smtClean="0"/>
+              <a:t>-framework </a:t>
+            </a:r>
+            <a:r>
+              <a:rPr lang="sr-Cyrl-RS" dirty="0" smtClean="0"/>
+              <a:t>библиотека)</a:t>
+            </a:r>
+            <a:endParaRPr lang="en-GB" dirty="0" smtClean="0"/>
+          </a:p>
+          <a:p>
+            <a:r>
+              <a:rPr lang="sr-Cyrl-RS" dirty="0" smtClean="0"/>
+              <a:t>Омогућава једноставно пуштање фајлова, не пуно преко тога</a:t>
+            </a:r>
+          </a:p>
+          <a:p>
+            <a:r>
+              <a:rPr lang="sr-Cyrl-RS" dirty="0" smtClean="0"/>
+              <a:t>Потребно је имплементирати остале елементе</a:t>
+            </a:r>
+            <a:endParaRPr lang="en-US" dirty="0"/>
+          </a:p>
+        </p:txBody>
+      </p:sp>
+    </p:spTree>
+    <p:extLst>
+      <p:ext uri="{BB962C8B-B14F-4D97-AF65-F5344CB8AC3E}">
+        <p14:creationId xmlns:p14="http://schemas.microsoft.com/office/powerpoint/2010/main" val="3158025815"/>
+      </p:ext>
+    </p:extLst>
+  </p:cSld>
+  <p:clrMapOvr>
+    <a:masterClrMapping/>
+  </p:clrMapOvr>
+  <p:timing>
+    <p:tnLst>
+      <p:par>
+        <p:cTn id="1" dur="indefinite" restart="never" nodeType="tmRoot"/>
+      </p:par>
+    </p:tnLst>
+  </p:timing>
+</p:sld>
+</file>
+
+<file path=ppt/slides/slide6.xml><?xml version="1.0" encoding="utf-8"?>
+<p:sld xmlns:a="http://schemas.openxmlformats.org/drawingml/2006/main" xmlns:r="http://schemas.openxmlformats.org/officeDocument/2006/relationships" xmlns:p="http://schemas.openxmlformats.org/presentationml/2006/main">
+  <p:cSld>
+    <p:spTree>
+      <p:nvGrpSpPr>
+        <p:cNvPr id="1" name=""/>
+        <p:cNvGrpSpPr/>
+        <p:nvPr/>
+      </p:nvGrpSpPr>
+      <p:grpSpPr>
+        <a:xfrm>
+          <a:off x="0" y="0"/>
+          <a:ext cx="0" cy="0"/>
+          <a:chOff x="0" y="0"/>
+          <a:chExt cx="0" cy="0"/>
+        </a:xfrm>
+      </p:grpSpPr>
+      <p:sp>
+        <p:nvSpPr>
+          <p:cNvPr id="4" name="Title 3"/>
+          <p:cNvSpPr>
+            <a:spLocks noGrp="1"/>
+          </p:cNvSpPr>
+          <p:nvPr>
+            <p:ph type="title"/>
+          </p:nvPr>
+        </p:nvSpPr>
+        <p:spPr/>
+        <p:txBody>
+          <a:bodyPr/>
+          <a:lstStyle/>
+          <a:p>
+            <a:r>
+              <a:rPr lang="sr-Cyrl-RS" dirty="0" smtClean="0"/>
+              <a:t>Идеје - резиме</a:t>
+            </a:r>
+            <a:endParaRPr lang="en-US" dirty="0"/>
+          </a:p>
+        </p:txBody>
+      </p:sp>
+      <p:sp>
+        <p:nvSpPr>
+          <p:cNvPr id="5" name="Content Placeholder 4"/>
+          <p:cNvSpPr>
+            <a:spLocks noGrp="1"/>
+          </p:cNvSpPr>
+          <p:nvPr>
+            <p:ph idx="1"/>
+          </p:nvPr>
+        </p:nvSpPr>
+        <p:spPr/>
+        <p:txBody>
+          <a:bodyPr/>
+          <a:lstStyle/>
+          <a:p>
+            <a:r>
+              <a:rPr lang="sr-Cyrl-RS" dirty="0" smtClean="0"/>
+              <a:t>Треба имати добро дизајниран ГУИ (али не по сваку цену!)</a:t>
+            </a:r>
+          </a:p>
+          <a:p>
+            <a:r>
+              <a:rPr lang="sr-Cyrl-RS" dirty="0" smtClean="0"/>
+              <a:t>Треба спровести основне аудио ефекте (али не пренадувати посао!)</a:t>
+            </a:r>
+          </a:p>
+          <a:p>
+            <a:r>
+              <a:rPr lang="sr-Cyrl-RS" dirty="0" smtClean="0"/>
+              <a:t>Треба подржати више формата (али радити на квалитету пре него на подршци!)</a:t>
+            </a:r>
+          </a:p>
+          <a:p>
+            <a:r>
+              <a:rPr lang="sr-Cyrl-RS" dirty="0" smtClean="0"/>
+              <a:t>Треба да буде брза и стабилна (али без функционалности то не важи!)</a:t>
+            </a:r>
+            <a:endParaRPr lang="en-US" dirty="0"/>
+          </a:p>
+        </p:txBody>
+      </p:sp>
+    </p:spTree>
+    <p:extLst>
+      <p:ext uri="{BB962C8B-B14F-4D97-AF65-F5344CB8AC3E}">
+        <p14:creationId xmlns:p14="http://schemas.microsoft.com/office/powerpoint/2010/main" val="1768509210"/>
+      </p:ext>
+    </p:extLst>
+  </p:cSld>
+  <p:clrMapOvr>
+    <a:masterClrMapping/>
+  </p:clrMapOvr>
+</p:sld>
+</file>
+
+<file path=ppt/slides/slide7.xml><?xml version="1.0" encoding="utf-8"?>
+<p:sld xmlns:a="http://schemas.openxmlformats.org/drawingml/2006/main" xmlns:r="http://schemas.openxmlformats.org/officeDocument/2006/relationships" xmlns:p="http://schemas.openxmlformats.org/presentationml/2006/main">
+  <p:cSld>
+    <p:spTree>
+      <p:nvGrpSpPr>
+        <p:cNvPr id="1" name=""/>
+        <p:cNvGrpSpPr/>
+        <p:nvPr/>
+      </p:nvGrpSpPr>
+      <p:grpSpPr>
+        <a:xfrm>
+          <a:off x="0" y="0"/>
+          <a:ext cx="0" cy="0"/>
+          <a:chOff x="0" y="0"/>
+          <a:chExt cx="0" cy="0"/>
+        </a:xfrm>
+      </p:grpSpPr>
+      <p:sp>
+        <p:nvSpPr>
+          <p:cNvPr id="2" name="Title 1"/>
+          <p:cNvSpPr>
+            <a:spLocks noGrp="1"/>
+          </p:cNvSpPr>
+          <p:nvPr>
+            <p:ph type="title"/>
+          </p:nvPr>
+        </p:nvSpPr>
+        <p:spPr/>
+        <p:txBody>
+          <a:bodyPr/>
+          <a:lstStyle/>
+          <a:p>
+            <a:r>
+              <a:rPr lang="sr-Cyrl-RS" dirty="0" smtClean="0"/>
+              <a:t>Спровођење идеја – алати</a:t>
+            </a:r>
+            <a:endParaRPr lang="en-US" dirty="0"/>
+          </a:p>
+        </p:txBody>
+      </p:sp>
+      <p:sp>
+        <p:nvSpPr>
+          <p:cNvPr id="3" name="Content Placeholder 2"/>
+          <p:cNvSpPr>
+            <a:spLocks noGrp="1"/>
+          </p:cNvSpPr>
+          <p:nvPr>
+            <p:ph idx="1"/>
+          </p:nvPr>
+        </p:nvSpPr>
+        <p:spPr/>
+        <p:txBody>
+          <a:bodyPr/>
+          <a:lstStyle/>
+          <a:p>
+            <a:r>
+              <a:rPr lang="en-GB" dirty="0" smtClean="0"/>
+              <a:t>C</a:t>
+            </a:r>
+            <a:r>
+              <a:rPr lang="sr-Latn-RS" dirty="0" smtClean="0"/>
+              <a:t>#</a:t>
+            </a:r>
+            <a:endParaRPr lang="sr-Cyrl-RS" dirty="0" smtClean="0"/>
+          </a:p>
+          <a:p>
+            <a:r>
+              <a:rPr lang="sr-Latn-RS" dirty="0" smtClean="0"/>
+              <a:t>.net framework</a:t>
+            </a:r>
+            <a:endParaRPr lang="sr-Cyrl-RS" dirty="0"/>
+          </a:p>
+          <a:p>
+            <a:r>
+              <a:rPr lang="sr-Latn-RS" dirty="0" smtClean="0"/>
+              <a:t>MetroFramewor</a:t>
+            </a:r>
+            <a:r>
+              <a:rPr lang="en-GB" dirty="0" smtClean="0"/>
+              <a:t>k,</a:t>
+            </a:r>
+            <a:r>
+              <a:rPr lang="sr-Cyrl-RS" dirty="0" smtClean="0"/>
+              <a:t> </a:t>
+            </a:r>
+            <a:r>
+              <a:rPr lang="en-GB" dirty="0" smtClean="0"/>
+              <a:t>N</a:t>
+            </a:r>
+            <a:r>
+              <a:rPr lang="sr-Latn-RS" dirty="0" smtClean="0"/>
+              <a:t>A</a:t>
+            </a:r>
+            <a:r>
+              <a:rPr lang="en-GB" dirty="0" err="1" smtClean="0"/>
+              <a:t>udio</a:t>
+            </a:r>
+            <a:endParaRPr lang="en-GB" dirty="0" smtClean="0"/>
+          </a:p>
+          <a:p>
+            <a:r>
+              <a:rPr lang="en-GB" dirty="0" smtClean="0"/>
+              <a:t> </a:t>
+            </a:r>
+            <a:r>
+              <a:rPr lang="sr-Latn-RS" dirty="0" smtClean="0"/>
+              <a:t>SCRUM </a:t>
+            </a:r>
+            <a:r>
+              <a:rPr lang="sr-Cyrl-RS" dirty="0" smtClean="0"/>
+              <a:t>методологија</a:t>
+            </a:r>
+          </a:p>
+          <a:p>
+            <a:r>
+              <a:rPr lang="en-GB" dirty="0" smtClean="0"/>
+              <a:t>GitHub</a:t>
+            </a:r>
+            <a:endParaRPr lang="en-US" dirty="0"/>
+          </a:p>
+        </p:txBody>
+      </p:sp>
+    </p:spTree>
+    <p:extLst>
+      <p:ext uri="{BB962C8B-B14F-4D97-AF65-F5344CB8AC3E}">
+        <p14:creationId xmlns:p14="http://schemas.microsoft.com/office/powerpoint/2010/main" val="3599272901"/>
+      </p:ext>
+    </p:extLst>
+  </p:cSld>
+  <p:clrMapOvr>
+    <a:masterClrMapping/>
+  </p:clrMapOvr>
+</p:sld>
+</file>
+
+<file path=ppt/slides/slide8.xml><?xml version="1.0" encoding="utf-8"?>
+<p:sld xmlns:a="http://schemas.openxmlformats.org/drawingml/2006/main" xmlns:r="http://schemas.openxmlformats.org/officeDocument/2006/relationships" xmlns:p="http://schemas.openxmlformats.org/presentationml/2006/main">
+  <p:cSld>
+    <p:spTree>
+      <p:nvGrpSpPr>
+        <p:cNvPr id="1" name=""/>
+        <p:cNvGrpSpPr/>
+        <p:nvPr/>
+      </p:nvGrpSpPr>
+      <p:grpSpPr>
+        <a:xfrm>
+          <a:off x="0" y="0"/>
+          <a:ext cx="0" cy="0"/>
+          <a:chOff x="0" y="0"/>
+          <a:chExt cx="0" cy="0"/>
+        </a:xfrm>
+      </p:grpSpPr>
+      <p:sp>
+        <p:nvSpPr>
+          <p:cNvPr id="4" name="Title 3"/>
+          <p:cNvSpPr>
+            <a:spLocks noGrp="1"/>
+          </p:cNvSpPr>
+          <p:nvPr>
+            <p:ph type="title"/>
+          </p:nvPr>
+        </p:nvSpPr>
+        <p:spPr/>
+        <p:txBody>
+          <a:bodyPr/>
+          <a:lstStyle/>
+          <a:p>
+            <a:r>
+              <a:rPr lang="sr-Cyrl-RS" dirty="0"/>
+              <a:t>Спровођење </a:t>
+            </a:r>
+            <a:r>
+              <a:rPr lang="sr-Cyrl-RS" dirty="0" smtClean="0"/>
+              <a:t>идеја - приказ</a:t>
+            </a:r>
+            <a:endParaRPr lang="en-US" dirty="0"/>
+          </a:p>
+        </p:txBody>
+      </p:sp>
+      <p:sp>
+        <p:nvSpPr>
+          <p:cNvPr id="7" name="Content Placeholder 6"/>
+          <p:cNvSpPr>
+            <a:spLocks noGrp="1"/>
+          </p:cNvSpPr>
+          <p:nvPr>
+            <p:ph idx="1"/>
+          </p:nvPr>
+        </p:nvSpPr>
+        <p:spPr/>
+        <p:txBody>
+          <a:bodyPr/>
+          <a:lstStyle/>
+          <a:p>
+            <a:r>
+              <a:rPr lang="sr-Cyrl-RS" dirty="0" smtClean="0"/>
+              <a:t>Приказ поменутих алата...</a:t>
+            </a:r>
+            <a:endParaRPr lang="en-US" dirty="0"/>
+          </a:p>
+        </p:txBody>
+      </p:sp>
+    </p:spTree>
+    <p:extLst>
+      <p:ext uri="{BB962C8B-B14F-4D97-AF65-F5344CB8AC3E}">
+        <p14:creationId xmlns:p14="http://schemas.microsoft.com/office/powerpoint/2010/main" val="1356937862"/>
+      </p:ext>
+    </p:extLst>
+  </p:cSld>
+  <p:clrMapOvr>
+    <a:masterClrMapping/>
+  </p:clrMapOvr>
+</p:sld>
+</file>
+
+<file path=ppt/slides/slide9.xml><?xml version="1.0" encoding="utf-8"?>
+<p:sld xmlns:a="http://schemas.openxmlformats.org/drawingml/2006/main" xmlns:r="http://schemas.openxmlformats.org/officeDocument/2006/relationships" xmlns:p="http://schemas.openxmlformats.org/presentationml/2006/main">
+  <p:cSld>
+    <p:spTree>
+      <p:nvGrpSpPr>
+        <p:cNvPr id="1" name=""/>
+        <p:cNvGrpSpPr/>
+        <p:nvPr/>
+      </p:nvGrpSpPr>
+      <p:grpSpPr>
+        <a:xfrm>
+          <a:off x="0" y="0"/>
+          <a:ext cx="0" cy="0"/>
+          <a:chOff x="0" y="0"/>
+          <a:chExt cx="0" cy="0"/>
+        </a:xfrm>
+      </p:grpSpPr>
+      <p:sp>
+        <p:nvSpPr>
+          <p:cNvPr id="2" name="Title 1"/>
+          <p:cNvSpPr>
+            <a:spLocks noGrp="1"/>
+          </p:cNvSpPr>
+          <p:nvPr>
+            <p:ph type="title"/>
+          </p:nvPr>
+        </p:nvSpPr>
+        <p:spPr/>
+        <p:txBody>
+          <a:bodyPr/>
+          <a:lstStyle/>
+          <a:p>
+            <a:r>
+              <a:rPr lang="sr-Cyrl-RS" dirty="0" smtClean="0"/>
+              <a:t>Спровођење идеја – зашто баш то?</a:t>
+            </a:r>
+            <a:endParaRPr lang="en-US" dirty="0"/>
+          </a:p>
+        </p:txBody>
+      </p:sp>
+      <p:sp>
+        <p:nvSpPr>
+          <p:cNvPr id="3" name="Content Placeholder 2"/>
+          <p:cNvSpPr>
+            <a:spLocks noGrp="1"/>
+          </p:cNvSpPr>
+          <p:nvPr>
+            <p:ph idx="1"/>
+          </p:nvPr>
+        </p:nvSpPr>
+        <p:spPr/>
+        <p:txBody>
+          <a:bodyPr/>
+          <a:lstStyle/>
+          <a:p>
+            <a:r>
+              <a:rPr lang="en-GB" dirty="0"/>
+              <a:t>C</a:t>
+            </a:r>
+            <a:r>
+              <a:rPr lang="sr-Latn-RS" dirty="0" smtClean="0"/>
+              <a:t>#</a:t>
+            </a:r>
+            <a:r>
+              <a:rPr lang="sr-Cyrl-RS" dirty="0" smtClean="0"/>
+              <a:t> и </a:t>
+            </a:r>
+            <a:r>
+              <a:rPr lang="sr-Latn-RS" dirty="0" smtClean="0"/>
+              <a:t>.net framework</a:t>
+            </a:r>
+            <a:r>
+              <a:rPr lang="sr-Cyrl-RS" dirty="0" smtClean="0"/>
+              <a:t> нам омогућавају огромну подршку заједнице, моћно окружење за развој као и доста додатних и пропратних алата</a:t>
+            </a:r>
+          </a:p>
+          <a:p>
+            <a:r>
+              <a:rPr lang="sr-Latn-RS" dirty="0"/>
+              <a:t>MetroFramewor</a:t>
+            </a:r>
+            <a:r>
+              <a:rPr lang="en-GB" dirty="0"/>
+              <a:t>k,</a:t>
+            </a:r>
+            <a:r>
+              <a:rPr lang="sr-Cyrl-RS" dirty="0"/>
+              <a:t> </a:t>
+            </a:r>
+            <a:r>
+              <a:rPr lang="en-GB" dirty="0" smtClean="0"/>
+              <a:t>N</a:t>
+            </a:r>
+            <a:r>
+              <a:rPr lang="sr-Cyrl-RS" dirty="0" smtClean="0"/>
+              <a:t>А</a:t>
+            </a:r>
+            <a:r>
+              <a:rPr lang="en-GB" dirty="0" err="1" smtClean="0"/>
+              <a:t>udio</a:t>
+            </a:r>
+            <a:r>
+              <a:rPr lang="sr-Cyrl-RS" dirty="0" smtClean="0"/>
+              <a:t> – доста коришћене,отвореног кода, поуздане</a:t>
+            </a:r>
+          </a:p>
+          <a:p>
+            <a:r>
+              <a:rPr lang="sr-Latn-RS" dirty="0" smtClean="0"/>
+              <a:t>SCRUM</a:t>
+            </a:r>
+            <a:r>
+              <a:rPr lang="sr-Cyrl-RS" dirty="0" smtClean="0"/>
+              <a:t> – динамичан, брз одговор на промену захтева, итеративан, систематичан</a:t>
+            </a:r>
+          </a:p>
+          <a:p>
+            <a:r>
+              <a:rPr lang="en-GB" dirty="0" smtClean="0"/>
+              <a:t>GitHub</a:t>
+            </a:r>
+            <a:r>
+              <a:rPr lang="sr-Cyrl-RS" dirty="0" smtClean="0"/>
+              <a:t> – врло популаран, база великих пројеката, стандардан ГИТ ток рада</a:t>
+            </a:r>
+            <a:endParaRPr lang="en-US" dirty="0"/>
+          </a:p>
+        </p:txBody>
+      </p:sp>
+    </p:spTree>
+    <p:extLst>
+      <p:ext uri="{BB962C8B-B14F-4D97-AF65-F5344CB8AC3E}">
+        <p14:creationId xmlns:p14="http://schemas.microsoft.com/office/powerpoint/2010/main" val="3920476399"/>
       </p:ext>
     </p:extLst>
   </p:cSld>

</xml_diff>